<commit_message>
docker file and tf variable aggregation
</commit_message>
<xml_diff>
--- a/Projektplan.pptx
+++ b/Projektplan.pptx
@@ -243,7 +243,7 @@
           <a:p>
             <a:fld id="{86C988DC-9DE3-4390-97AB-D61B85DACE57}" type="datetimeFigureOut">
               <a:rPr lang="pt-PT" smtClean="0"/>
-              <a:t>19/06/2020</a:t>
+              <a:t>02/07/2020</a:t>
             </a:fld>
             <a:endParaRPr lang="pt-PT"/>
           </a:p>
@@ -420,7 +420,7 @@
           <a:p>
             <a:fld id="{0835B8F7-DAC4-4931-8AED-4356A8B2FD64}" type="datetimeFigureOut">
               <a:rPr lang="pt-BR" smtClean="0"/>
-              <a:t>19/06/2020</a:t>
+              <a:t>01/07/2020</a:t>
             </a:fld>
             <a:endParaRPr lang="pt-BR"/>
           </a:p>
@@ -2448,7 +2448,7 @@
           <a:graphicData uri="http://schemas.openxmlformats.org/presentationml/2006/ole">
             <mc:AlternateContent xmlns:mc="http://schemas.openxmlformats.org/markup-compatibility/2006">
               <mc:Choice xmlns:v="urn:schemas-microsoft-com:vml" Requires="v">
-                <p:oleObj spid="_x0000_s40191" name="think-cell Slide" r:id="rId4" imgW="270" imgH="270" progId="TCLayout.ActiveDocument.1">
+                <p:oleObj spid="_x0000_s40192" name="think-cell Slide" r:id="rId4" imgW="270" imgH="270" progId="TCLayout.ActiveDocument.1">
                   <p:embed/>
                 </p:oleObj>
               </mc:Choice>
@@ -3544,7 +3544,7 @@
           <a:graphicData uri="http://schemas.openxmlformats.org/presentationml/2006/ole">
             <mc:AlternateContent xmlns:mc="http://schemas.openxmlformats.org/markup-compatibility/2006">
               <mc:Choice xmlns:v="urn:schemas-microsoft-com:vml" Requires="v">
-                <p:oleObj spid="_x0000_s43233" name="think-cell Slide" r:id="rId4" imgW="270" imgH="270" progId="TCLayout.ActiveDocument.1">
+                <p:oleObj spid="_x0000_s43234" name="think-cell Slide" r:id="rId4" imgW="270" imgH="270" progId="TCLayout.ActiveDocument.1">
                   <p:embed/>
                 </p:oleObj>
               </mc:Choice>
@@ -7538,7 +7538,7 @@
           <a:graphicData uri="http://schemas.openxmlformats.org/presentationml/2006/ole">
             <mc:AlternateContent xmlns:mc="http://schemas.openxmlformats.org/markup-compatibility/2006">
               <mc:Choice xmlns:v="urn:schemas-microsoft-com:vml" Requires="v">
-                <p:oleObj spid="_x0000_s41192" name="think-cell Slide" r:id="rId4" imgW="360" imgH="360" progId="">
+                <p:oleObj spid="_x0000_s41193" name="think-cell Slide" r:id="rId4" imgW="360" imgH="360" progId="">
                   <p:embed/>
                 </p:oleObj>
               </mc:Choice>
@@ -7875,7 +7875,7 @@
           <a:graphicData uri="http://schemas.openxmlformats.org/presentationml/2006/ole">
             <mc:AlternateContent xmlns:mc="http://schemas.openxmlformats.org/markup-compatibility/2006">
               <mc:Choice xmlns:v="urn:schemas-microsoft-com:vml" Requires="v">
-                <p:oleObj spid="_x0000_s24958" name="think-cell Slide" r:id="rId4" imgW="270" imgH="270" progId="TCLayout.ActiveDocument.1">
+                <p:oleObj spid="_x0000_s24959" name="think-cell Slide" r:id="rId4" imgW="270" imgH="270" progId="TCLayout.ActiveDocument.1">
                   <p:embed/>
                 </p:oleObj>
               </mc:Choice>
@@ -9082,7 +9082,7 @@
           <a:graphicData uri="http://schemas.openxmlformats.org/presentationml/2006/ole">
             <mc:AlternateContent xmlns:mc="http://schemas.openxmlformats.org/markup-compatibility/2006">
               <mc:Choice xmlns:v="urn:schemas-microsoft-com:vml" Requires="v">
-                <p:oleObj spid="_x0000_s3542" name="think-cell Slide" r:id="rId16" imgW="270" imgH="270" progId="TCLayout.ActiveDocument.1">
+                <p:oleObj spid="_x0000_s3543" name="think-cell Slide" r:id="rId16" imgW="270" imgH="270" progId="TCLayout.ActiveDocument.1">
                   <p:embed/>
                 </p:oleObj>
               </mc:Choice>

</xml_diff>